<commit_message>
chore: modify pre parper report
</commit_message>
<xml_diff>
--- a/doc/paper/缑通旺-开题.pptx
+++ b/doc/paper/缑通旺-开题.pptx
@@ -34808,7 +34808,7 @@
                 <a:cs typeface="+mn-ea"/>
                 <a:sym typeface="+mn-lt"/>
               </a:rPr>
-              <a:t>4.10 </a:t>
+              <a:t>4.15 </a:t>
             </a:r>
             <a:r>
               <a:rPr lang="zh-CN" altLang="en-US" sz="2000" dirty="0">
@@ -36937,7 +36937,7 @@
                 <a:cs typeface="+mn-ea"/>
                 <a:sym typeface="+mn-lt"/>
               </a:rPr>
-              <a:t>4.11</a:t>
+              <a:t>4.15</a:t>
             </a:r>
             <a:r>
               <a:rPr lang="zh-CN" altLang="en-US" sz="2000" dirty="0">
@@ -36951,14 +36951,14 @@
                 <a:cs typeface="+mn-ea"/>
                 <a:sym typeface="+mn-lt"/>
               </a:rPr>
-              <a:t>5.01 </a:t>
+              <a:t>5.15 </a:t>
             </a:r>
             <a:r>
               <a:rPr lang="zh-CN" altLang="en-US" sz="2000" dirty="0">
                 <a:cs typeface="+mn-ea"/>
                 <a:sym typeface="+mn-lt"/>
               </a:rPr>
-              <a:t>完成请求反解析分析，生成接口代码的功能</a:t>
+              <a:t>深入学习WebAssembly的编码与运用</a:t>
             </a:r>
             <a:endParaRPr lang="zh-CN" altLang="en-US" sz="2000" dirty="0">
               <a:cs typeface="+mn-ea"/>
@@ -36976,7 +36976,7 @@
         <p:spPr bwMode="auto">
           <a:xfrm>
             <a:off x="1699260" y="2913380"/>
-            <a:ext cx="7181215" cy="727710"/>
+            <a:ext cx="8825230" cy="727710"/>
           </a:xfrm>
           <a:prstGeom prst="rect">
             <a:avLst/>
@@ -37088,7 +37088,7 @@
                 <a:cs typeface="+mn-ea"/>
                 <a:sym typeface="+mn-lt"/>
               </a:rPr>
-              <a:t>5.01</a:t>
+              <a:t>5.16</a:t>
             </a:r>
             <a:r>
               <a:rPr lang="zh-CN" altLang="en-US" sz="2000" dirty="0">
@@ -37102,14 +37102,14 @@
                 <a:cs typeface="+mn-ea"/>
                 <a:sym typeface="+mn-lt"/>
               </a:rPr>
-              <a:t>6.01 </a:t>
+              <a:t>7.15 </a:t>
             </a:r>
             <a:r>
               <a:rPr lang="zh-CN" altLang="en-US" sz="2000" dirty="0">
                 <a:cs typeface="+mn-ea"/>
                 <a:sym typeface="+mn-lt"/>
               </a:rPr>
-              <a:t>完成接口生命周期管理的模块以及性能需求</a:t>
+              <a:t>完成接口生命周期管理的模块、数据包反解析分析以及性能需求</a:t>
             </a:r>
             <a:endParaRPr lang="zh-CN" altLang="en-US" sz="2000" dirty="0">
               <a:cs typeface="+mn-ea"/>
@@ -37239,7 +37239,7 @@
                 <a:cs typeface="+mn-ea"/>
                 <a:sym typeface="+mn-lt"/>
               </a:rPr>
-              <a:t>6.01</a:t>
+              <a:t>7.16</a:t>
             </a:r>
             <a:r>
               <a:rPr lang="zh-CN" altLang="en-US" sz="2000" dirty="0">
@@ -37253,7 +37253,7 @@
                 <a:cs typeface="+mn-ea"/>
                 <a:sym typeface="+mn-lt"/>
               </a:rPr>
-              <a:t>8.15 </a:t>
+              <a:t>9.15 </a:t>
             </a:r>
             <a:r>
               <a:rPr lang="zh-CN" altLang="en-US" sz="2000" dirty="0">
@@ -37390,20 +37390,6 @@
                 <a:cs typeface="+mn-ea"/>
                 <a:sym typeface="+mn-lt"/>
               </a:rPr>
-              <a:t>8.15</a:t>
-            </a:r>
-            <a:r>
-              <a:rPr lang="zh-CN" altLang="en-US" sz="2000" dirty="0">
-                <a:cs typeface="+mn-ea"/>
-                <a:sym typeface="+mn-lt"/>
-              </a:rPr>
-              <a:t>～</a:t>
-            </a:r>
-            <a:r>
-              <a:rPr lang="en-US" altLang="zh-CN" sz="2000" dirty="0">
-                <a:cs typeface="+mn-ea"/>
-                <a:sym typeface="+mn-lt"/>
-              </a:rPr>
               <a:t>9.15</a:t>
             </a:r>
             <a:r>
@@ -37411,7 +37397,7 @@
                 <a:cs typeface="+mn-ea"/>
                 <a:sym typeface="+mn-lt"/>
               </a:rPr>
-              <a:t> 完成论文撰写</a:t>
+              <a:t>～答辩 完成论文撰写</a:t>
             </a:r>
             <a:endParaRPr lang="zh-CN" altLang="en-US" sz="2000" dirty="0">
               <a:cs typeface="+mn-ea"/>

</xml_diff>